<commit_message>
Merge and add more files
</commit_message>
<xml_diff>
--- a/Project Poster.pptx
+++ b/Project Poster.pptx
@@ -270,7 +270,7 @@
             <a:fld id="{EDAC6055-BED3-441F-92AC-38E57413D38A}" type="datetime1">
               <a:rPr lang="en-US" altLang="en-US"/>
               <a:pPr/>
-              <a:t>8/3/2020</a:t>
+              <a:t>8/9/20</a:t>
             </a:fld>
             <a:endParaRPr lang="en-US" altLang="en-US"/>
           </a:p>
@@ -462,7 +462,7 @@
             <a:fld id="{24751E58-F098-4B7F-81BC-F51406B70D95}" type="datetime1">
               <a:rPr lang="en-US" altLang="en-US"/>
               <a:pPr/>
-              <a:t>8/3/2020</a:t>
+              <a:t>8/9/20</a:t>
             </a:fld>
             <a:endParaRPr lang="en-US" altLang="en-US"/>
           </a:p>
@@ -958,7 +958,7 @@
             <a:fld id="{645BB259-A352-4EB3-8ABF-134E29B1E5F0}" type="datetime1">
               <a:rPr lang="en-US" altLang="en-US"/>
               <a:pPr/>
-              <a:t>8/3/2020</a:t>
+              <a:t>8/9/20</a:t>
             </a:fld>
             <a:endParaRPr lang="en-US" altLang="en-US"/>
           </a:p>
@@ -1143,7 +1143,7 @@
             <a:fld id="{78E00C68-3E00-4B4A-BA1B-53F232C24194}" type="datetime1">
               <a:rPr lang="en-US" altLang="en-US"/>
               <a:pPr/>
-              <a:t>8/3/2020</a:t>
+              <a:t>8/9/20</a:t>
             </a:fld>
             <a:endParaRPr lang="en-US" altLang="en-US"/>
           </a:p>
@@ -1338,7 +1338,7 @@
             <a:fld id="{121D94DF-45C0-4A2C-AB74-4DB596A15330}" type="datetime1">
               <a:rPr lang="en-US" altLang="en-US"/>
               <a:pPr/>
-              <a:t>8/3/2020</a:t>
+              <a:t>8/9/20</a:t>
             </a:fld>
             <a:endParaRPr lang="en-US" altLang="en-US"/>
           </a:p>
@@ -1523,7 +1523,7 @@
             <a:fld id="{088C3835-CEE0-4505-9665-5573C790ED16}" type="datetime1">
               <a:rPr lang="en-US" altLang="en-US"/>
               <a:pPr/>
-              <a:t>8/3/2020</a:t>
+              <a:t>8/9/20</a:t>
             </a:fld>
             <a:endParaRPr lang="en-US" altLang="en-US"/>
           </a:p>
@@ -1785,7 +1785,7 @@
             <a:fld id="{D5EC548E-AB30-45E3-9EFD-4ABD517D5FFB}" type="datetime1">
               <a:rPr lang="en-US" altLang="en-US"/>
               <a:pPr/>
-              <a:t>8/3/2020</a:t>
+              <a:t>8/9/20</a:t>
             </a:fld>
             <a:endParaRPr lang="en-US" altLang="en-US"/>
           </a:p>
@@ -2087,7 +2087,7 @@
             <a:fld id="{9C9EA653-160A-48A7-96FE-D81DDD2A6265}" type="datetime1">
               <a:rPr lang="en-US" altLang="en-US"/>
               <a:pPr/>
-              <a:t>8/3/2020</a:t>
+              <a:t>8/9/20</a:t>
             </a:fld>
             <a:endParaRPr lang="en-US" altLang="en-US"/>
           </a:p>
@@ -2523,7 +2523,7 @@
             <a:fld id="{2F9FB84D-DD03-420E-8CB9-41B71FB842D0}" type="datetime1">
               <a:rPr lang="en-US" altLang="en-US"/>
               <a:pPr/>
-              <a:t>8/3/2020</a:t>
+              <a:t>8/9/20</a:t>
             </a:fld>
             <a:endParaRPr lang="en-US" altLang="en-US"/>
           </a:p>
@@ -2657,7 +2657,7 @@
             <a:fld id="{C7B1E4B5-FC98-4F60-98B5-0E1785FC4AC2}" type="datetime1">
               <a:rPr lang="en-US" altLang="en-US"/>
               <a:pPr/>
-              <a:t>8/3/2020</a:t>
+              <a:t>8/9/20</a:t>
             </a:fld>
             <a:endParaRPr lang="en-US" altLang="en-US"/>
           </a:p>
@@ -2769,7 +2769,7 @@
             <a:fld id="{31B70B8E-EA66-4125-B228-E7659303DF53}" type="datetime1">
               <a:rPr lang="en-US" altLang="en-US"/>
               <a:pPr/>
-              <a:t>8/3/2020</a:t>
+              <a:t>8/9/20</a:t>
             </a:fld>
             <a:endParaRPr lang="en-US" altLang="en-US"/>
           </a:p>
@@ -3061,7 +3061,7 @@
             <a:fld id="{F6E4866A-E706-4541-8880-33314C2B233F}" type="datetime1">
               <a:rPr lang="en-US" altLang="en-US"/>
               <a:pPr/>
-              <a:t>8/3/2020</a:t>
+              <a:t>8/9/20</a:t>
             </a:fld>
             <a:endParaRPr lang="en-US" altLang="en-US"/>
           </a:p>
@@ -3333,7 +3333,7 @@
             <a:fld id="{DB3EE76A-02DB-42FA-91C2-3E760E39DD17}" type="datetime1">
               <a:rPr lang="en-US" altLang="en-US"/>
               <a:pPr/>
-              <a:t>8/3/2020</a:t>
+              <a:t>8/9/20</a:t>
             </a:fld>
             <a:endParaRPr lang="en-US" altLang="en-US"/>
           </a:p>
@@ -3613,7 +3613,7 @@
             <a:fld id="{FEA6808C-36B9-4536-83CF-D3C352952614}" type="datetime1">
               <a:rPr lang="en-US" altLang="en-US"/>
               <a:pPr/>
-              <a:t>8/3/2020</a:t>
+              <a:t>8/9/20</a:t>
             </a:fld>
             <a:endParaRPr lang="en-US" altLang="en-US"/>
           </a:p>
@@ -4339,7 +4339,7 @@
               <a:rPr lang="en-US" altLang="en-US" sz="8000" dirty="0">
                 <a:ea typeface="ＭＳ Ｐゴシック" panose="020B0600070205080204" pitchFamily="34" charset="-128"/>
               </a:rPr>
-              <a:t>Poster Title</a:t>
+              <a:t>Credit Card Fraud Detection</a:t>
             </a:r>
             <a:br>
               <a:rPr lang="en-US" altLang="en-US" sz="11900" dirty="0">
@@ -4350,7 +4350,7 @@
               <a:rPr lang="en-US" altLang="en-US" sz="6000" dirty="0">
                 <a:ea typeface="ＭＳ Ｐゴシック" panose="020B0600070205080204" pitchFamily="34" charset="-128"/>
               </a:rPr>
-              <a:t>Author 1, Author 2, ……</a:t>
+              <a:t>Sidney Fletcher, Tao Li</a:t>
             </a:r>
           </a:p>
         </p:txBody>
@@ -4581,12 +4581,9 @@
                 <a:spcPct val="20000"/>
               </a:spcBef>
             </a:pPr>
-            <a:r>
-              <a:rPr lang="en-US" altLang="en-US" sz="3600" dirty="0">
-                <a:cs typeface="Arial" panose="020B0604020202020204" pitchFamily="34" charset="0"/>
-              </a:rPr>
-              <a:t>Text</a:t>
-            </a:r>
+            <a:endParaRPr lang="en-US" altLang="en-US" sz="3600" dirty="0">
+              <a:cs typeface="Arial" panose="020B0604020202020204" pitchFamily="34" charset="0"/>
+            </a:endParaRPr>
           </a:p>
           <a:p>
             <a:pPr marL="0" indent="0" eaLnBrk="1" hangingPunct="1">

</xml_diff>